<commit_message>
Fixed gender of cook
</commit_message>
<xml_diff>
--- a/presentation.pptx
+++ b/presentation.pptx
@@ -13433,7 +13433,7 @@
             <a:tbl>
               <a:tblPr>
                 <a:noFill/>
-                <a:tableStyleId>{E383B7AF-ED03-40D0-B5A9-C6EF4C4A8F24}</a:tableStyleId>
+                <a:tableStyleId>{95B7CF15-10FD-42C2-8AED-9419F51EFB9E}</a:tableStyleId>
               </a:tblPr>
               <a:tblGrid>
                 <a:gridCol w="773550"/>
@@ -14154,7 +14154,7 @@
             <a:tbl>
               <a:tblPr>
                 <a:noFill/>
-                <a:tableStyleId>{E383B7AF-ED03-40D0-B5A9-C6EF4C4A8F24}</a:tableStyleId>
+                <a:tableStyleId>{95B7CF15-10FD-42C2-8AED-9419F51EFB9E}</a:tableStyleId>
               </a:tblPr>
               <a:tblGrid>
                 <a:gridCol w="847750"/>
@@ -14443,7 +14443,7 @@
             <a:tbl>
               <a:tblPr>
                 <a:noFill/>
-                <a:tableStyleId>{E383B7AF-ED03-40D0-B5A9-C6EF4C4A8F24}</a:tableStyleId>
+                <a:tableStyleId>{95B7CF15-10FD-42C2-8AED-9419F51EFB9E}</a:tableStyleId>
               </a:tblPr>
               <a:tblGrid>
                 <a:gridCol w="847750"/>
@@ -14754,7 +14754,7 @@
             <a:tbl>
               <a:tblPr>
                 <a:noFill/>
-                <a:tableStyleId>{E383B7AF-ED03-40D0-B5A9-C6EF4C4A8F24}</a:tableStyleId>
+                <a:tableStyleId>{95B7CF15-10FD-42C2-8AED-9419F51EFB9E}</a:tableStyleId>
               </a:tblPr>
               <a:tblGrid>
                 <a:gridCol w="847750"/>
@@ -15065,7 +15065,7 @@
             <a:tbl>
               <a:tblPr>
                 <a:noFill/>
-                <a:tableStyleId>{E383B7AF-ED03-40D0-B5A9-C6EF4C4A8F24}</a:tableStyleId>
+                <a:tableStyleId>{95B7CF15-10FD-42C2-8AED-9419F51EFB9E}</a:tableStyleId>
               </a:tblPr>
               <a:tblGrid>
                 <a:gridCol w="847750"/>
@@ -15376,7 +15376,7 @@
             <a:tbl>
               <a:tblPr>
                 <a:noFill/>
-                <a:tableStyleId>{E383B7AF-ED03-40D0-B5A9-C6EF4C4A8F24}</a:tableStyleId>
+                <a:tableStyleId>{95B7CF15-10FD-42C2-8AED-9419F51EFB9E}</a:tableStyleId>
               </a:tblPr>
               <a:tblGrid>
                 <a:gridCol w="847750"/>
@@ -15677,7 +15677,7 @@
             <a:tbl>
               <a:tblPr>
                 <a:noFill/>
-                <a:tableStyleId>{E383B7AF-ED03-40D0-B5A9-C6EF4C4A8F24}</a:tableStyleId>
+                <a:tableStyleId>{95B7CF15-10FD-42C2-8AED-9419F51EFB9E}</a:tableStyleId>
               </a:tblPr>
               <a:tblGrid>
                 <a:gridCol w="847750"/>
@@ -15900,7 +15900,7 @@
             <a:tbl>
               <a:tblPr>
                 <a:noFill/>
-                <a:tableStyleId>{E383B7AF-ED03-40D0-B5A9-C6EF4C4A8F24}</a:tableStyleId>
+                <a:tableStyleId>{95B7CF15-10FD-42C2-8AED-9419F51EFB9E}</a:tableStyleId>
               </a:tblPr>
               <a:tblGrid>
                 <a:gridCol w="847750"/>
@@ -16063,7 +16063,7 @@
             <a:tbl>
               <a:tblPr>
                 <a:noFill/>
-                <a:tableStyleId>{E383B7AF-ED03-40D0-B5A9-C6EF4C4A8F24}</a:tableStyleId>
+                <a:tableStyleId>{95B7CF15-10FD-42C2-8AED-9419F51EFB9E}</a:tableStyleId>
               </a:tblPr>
               <a:tblGrid>
                 <a:gridCol w="847750"/>
@@ -21078,9 +21078,9 @@
           </a:stretch>
         </p:blipFill>
         <p:spPr>
-          <a:xfrm>
-            <a:off x="637784" y="2288597"/>
-            <a:ext cx="1603575" cy="1603575"/>
+          <a:xfrm rot="2700000">
+            <a:off x="1852525" y="1589175"/>
+            <a:ext cx="657300" cy="657300"/>
           </a:xfrm>
           <a:prstGeom prst="rect">
             <a:avLst/>
@@ -21098,7 +21098,7 @@
           <p:nvPr/>
         </p:nvPicPr>
         <p:blipFill>
-          <a:blip r:embed="rId4">
+          <a:blip r:embed="rId3">
             <a:alphaModFix/>
           </a:blip>
           <a:stretch>
@@ -21106,8 +21106,8 @@
           </a:stretch>
         </p:blipFill>
         <p:spPr>
-          <a:xfrm rot="2700000">
-            <a:off x="1844525" y="1755075"/>
+          <a:xfrm>
+            <a:off x="1118925" y="1347875"/>
             <a:ext cx="657300" cy="657300"/>
           </a:xfrm>
           <a:prstGeom prst="rect">
@@ -21126,35 +21126,7 @@
           <p:nvPr/>
         </p:nvPicPr>
         <p:blipFill>
-          <a:blip r:embed="rId4">
-            <a:alphaModFix/>
-          </a:blip>
-          <a:stretch>
-            <a:fillRect/>
-          </a:stretch>
-        </p:blipFill>
-        <p:spPr>
-          <a:xfrm>
-            <a:off x="1110925" y="1513775"/>
-            <a:ext cx="657300" cy="657300"/>
-          </a:xfrm>
-          <a:prstGeom prst="rect">
-            <a:avLst/>
-          </a:prstGeom>
-          <a:noFill/>
-          <a:ln>
-            <a:noFill/>
-          </a:ln>
-        </p:spPr>
-      </p:pic>
-      <p:pic>
-        <p:nvPicPr>
-          <p:cNvPr id="165" name="Google Shape;165;p16"/>
-          <p:cNvPicPr preferRelativeResize="0"/>
-          <p:nvPr/>
-        </p:nvPicPr>
-        <p:blipFill>
-          <a:blip r:embed="rId4">
+          <a:blip r:embed="rId3">
             <a:alphaModFix/>
           </a:blip>
           <a:stretch>
@@ -21163,7 +21135,7 @@
         </p:blipFill>
         <p:spPr>
           <a:xfrm rot="-2700000">
-            <a:off x="361300" y="1755075"/>
+            <a:off x="369300" y="1589175"/>
             <a:ext cx="657300" cy="657300"/>
           </a:xfrm>
           <a:prstGeom prst="rect">
@@ -21177,7 +21149,7 @@
       </p:pic>
       <p:sp>
         <p:nvSpPr>
-          <p:cNvPr id="166" name="Google Shape;166;p16"/>
+          <p:cNvPr id="165" name="Google Shape;165;p16"/>
           <p:cNvSpPr txBox="1"/>
           <p:nvPr/>
         </p:nvSpPr>
@@ -21229,6 +21201,34 @@
       </p:sp>
       <p:pic>
         <p:nvPicPr>
+          <p:cNvPr id="166" name="Google Shape;166;p16"/>
+          <p:cNvPicPr preferRelativeResize="0"/>
+          <p:nvPr/>
+        </p:nvPicPr>
+        <p:blipFill>
+          <a:blip r:embed="rId4">
+            <a:alphaModFix/>
+          </a:blip>
+          <a:stretch>
+            <a:fillRect/>
+          </a:stretch>
+        </p:blipFill>
+        <p:spPr>
+          <a:xfrm>
+            <a:off x="3770216" y="2288600"/>
+            <a:ext cx="1603575" cy="1603575"/>
+          </a:xfrm>
+          <a:prstGeom prst="rect">
+            <a:avLst/>
+          </a:prstGeom>
+          <a:noFill/>
+          <a:ln>
+            <a:noFill/>
+          </a:ln>
+        </p:spPr>
+      </p:pic>
+      <p:pic>
+        <p:nvPicPr>
           <p:cNvPr id="167" name="Google Shape;167;p16"/>
           <p:cNvPicPr preferRelativeResize="0"/>
           <p:nvPr/>
@@ -21243,7 +21243,7 @@
         </p:blipFill>
         <p:spPr>
           <a:xfrm>
-            <a:off x="3770216" y="2288600"/>
+            <a:off x="6902671" y="2288600"/>
             <a:ext cx="1603575" cy="1603575"/>
           </a:xfrm>
           <a:prstGeom prst="rect">
@@ -21271,7 +21271,7 @@
         </p:blipFill>
         <p:spPr>
           <a:xfrm>
-            <a:off x="6902671" y="2288600"/>
+            <a:off x="637775" y="2288600"/>
             <a:ext cx="1603575" cy="1603575"/>
           </a:xfrm>
           <a:prstGeom prst="rect">
@@ -21325,7 +21325,7 @@
                                           </p:stCondLst>
                                         </p:cTn>
                                         <p:tgtEl>
-                                          <p:spTgt spid="166"/>
+                                          <p:spTgt spid="165"/>
                                         </p:tgtEl>
                                         <p:attrNameLst>
                                           <p:attrName>style.visibility</p:attrName>
@@ -21339,7 +21339,7 @@
                                       <p:cBhvr additive="base">
                                         <p:cTn dur="1000"/>
                                         <p:tgtEl>
-                                          <p:spTgt spid="166"/>
+                                          <p:spTgt spid="165"/>
                                         </p:tgtEl>
                                         <p:attrNameLst>
                                           <p:attrName>ppt_y</p:attrName>
@@ -21393,7 +21393,7 @@
                                           </p:stCondLst>
                                         </p:cTn>
                                         <p:tgtEl>
-                                          <p:spTgt spid="167"/>
+                                          <p:spTgt spid="166"/>
                                         </p:tgtEl>
                                         <p:attrNameLst>
                                           <p:attrName>style.visibility</p:attrName>
@@ -21407,7 +21407,7 @@
                                       <p:cBhvr additive="base">
                                         <p:cTn dur="1500"/>
                                         <p:tgtEl>
-                                          <p:spTgt spid="167"/>
+                                          <p:spTgt spid="166"/>
                                         </p:tgtEl>
                                         <p:attrNameLst>
                                           <p:attrName>ppt_w</p:attrName>
@@ -21430,7 +21430,7 @@
                                       <p:cBhvr additive="base">
                                         <p:cTn dur="1500"/>
                                         <p:tgtEl>
-                                          <p:spTgt spid="167"/>
+                                          <p:spTgt spid="166"/>
                                         </p:tgtEl>
                                         <p:attrNameLst>
                                           <p:attrName>ppt_h</p:attrName>
@@ -21459,88 +21459,6 @@
                           <p:cTn fill="hold">
                             <p:stCondLst>
                               <p:cond delay="1500"/>
-                            </p:stCondLst>
-                            <p:childTnLst>
-                              <p:par>
-                                <p:cTn fill="hold" nodeType="afterEffect" presetClass="entr" presetID="23" presetSubtype="16">
-                                  <p:stCondLst>
-                                    <p:cond delay="0"/>
-                                  </p:stCondLst>
-                                  <p:childTnLst>
-                                    <p:set>
-                                      <p:cBhvr>
-                                        <p:cTn dur="1" fill="hold">
-                                          <p:stCondLst>
-                                            <p:cond delay="0"/>
-                                          </p:stCondLst>
-                                        </p:cTn>
-                                        <p:tgtEl>
-                                          <p:spTgt spid="165"/>
-                                        </p:tgtEl>
-                                        <p:attrNameLst>
-                                          <p:attrName>style.visibility</p:attrName>
-                                        </p:attrNameLst>
-                                      </p:cBhvr>
-                                      <p:to>
-                                        <p:strVal val="visible"/>
-                                      </p:to>
-                                    </p:set>
-                                    <p:anim calcmode="lin" valueType="num">
-                                      <p:cBhvr additive="base">
-                                        <p:cTn dur="500"/>
-                                        <p:tgtEl>
-                                          <p:spTgt spid="165"/>
-                                        </p:tgtEl>
-                                        <p:attrNameLst>
-                                          <p:attrName>ppt_w</p:attrName>
-                                        </p:attrNameLst>
-                                      </p:cBhvr>
-                                      <p:tavLst>
-                                        <p:tav fmla="" tm="0">
-                                          <p:val>
-                                            <p:strVal val="0"/>
-                                          </p:val>
-                                        </p:tav>
-                                        <p:tav fmla="" tm="100000">
-                                          <p:val>
-                                            <p:strVal val="#ppt_w"/>
-                                          </p:val>
-                                        </p:tav>
-                                      </p:tavLst>
-                                    </p:anim>
-                                    <p:anim calcmode="lin" valueType="num">
-                                      <p:cBhvr additive="base">
-                                        <p:cTn dur="500"/>
-                                        <p:tgtEl>
-                                          <p:spTgt spid="165"/>
-                                        </p:tgtEl>
-                                        <p:attrNameLst>
-                                          <p:attrName>ppt_h</p:attrName>
-                                        </p:attrNameLst>
-                                      </p:cBhvr>
-                                      <p:tavLst>
-                                        <p:tav fmla="" tm="0">
-                                          <p:val>
-                                            <p:strVal val="0"/>
-                                          </p:val>
-                                        </p:tav>
-                                        <p:tav fmla="" tm="100000">
-                                          <p:val>
-                                            <p:strVal val="#ppt_h"/>
-                                          </p:val>
-                                        </p:tav>
-                                      </p:tavLst>
-                                    </p:anim>
-                                  </p:childTnLst>
-                                </p:cTn>
-                              </p:par>
-                            </p:childTnLst>
-                          </p:cTn>
-                        </p:par>
-                        <p:par>
-                          <p:cTn fill="hold">
-                            <p:stCondLst>
-                              <p:cond delay="2000"/>
                             </p:stCondLst>
                             <p:childTnLst>
                               <p:par>
@@ -21622,7 +21540,7 @@
                         <p:par>
                           <p:cTn fill="hold">
                             <p:stCondLst>
-                              <p:cond delay="2500"/>
+                              <p:cond delay="2000"/>
                             </p:stCondLst>
                             <p:childTnLst>
                               <p:par>
@@ -21701,6 +21619,88 @@
                             </p:childTnLst>
                           </p:cTn>
                         </p:par>
+                        <p:par>
+                          <p:cTn fill="hold">
+                            <p:stCondLst>
+                              <p:cond delay="2500"/>
+                            </p:stCondLst>
+                            <p:childTnLst>
+                              <p:par>
+                                <p:cTn fill="hold" nodeType="afterEffect" presetClass="entr" presetID="23" presetSubtype="16">
+                                  <p:stCondLst>
+                                    <p:cond delay="0"/>
+                                  </p:stCondLst>
+                                  <p:childTnLst>
+                                    <p:set>
+                                      <p:cBhvr>
+                                        <p:cTn dur="1" fill="hold">
+                                          <p:stCondLst>
+                                            <p:cond delay="0"/>
+                                          </p:stCondLst>
+                                        </p:cTn>
+                                        <p:tgtEl>
+                                          <p:spTgt spid="162"/>
+                                        </p:tgtEl>
+                                        <p:attrNameLst>
+                                          <p:attrName>style.visibility</p:attrName>
+                                        </p:attrNameLst>
+                                      </p:cBhvr>
+                                      <p:to>
+                                        <p:strVal val="visible"/>
+                                      </p:to>
+                                    </p:set>
+                                    <p:anim calcmode="lin" valueType="num">
+                                      <p:cBhvr additive="base">
+                                        <p:cTn dur="500"/>
+                                        <p:tgtEl>
+                                          <p:spTgt spid="162"/>
+                                        </p:tgtEl>
+                                        <p:attrNameLst>
+                                          <p:attrName>ppt_w</p:attrName>
+                                        </p:attrNameLst>
+                                      </p:cBhvr>
+                                      <p:tavLst>
+                                        <p:tav fmla="" tm="0">
+                                          <p:val>
+                                            <p:strVal val="0"/>
+                                          </p:val>
+                                        </p:tav>
+                                        <p:tav fmla="" tm="100000">
+                                          <p:val>
+                                            <p:strVal val="#ppt_w"/>
+                                          </p:val>
+                                        </p:tav>
+                                      </p:tavLst>
+                                    </p:anim>
+                                    <p:anim calcmode="lin" valueType="num">
+                                      <p:cBhvr additive="base">
+                                        <p:cTn dur="500"/>
+                                        <p:tgtEl>
+                                          <p:spTgt spid="162"/>
+                                        </p:tgtEl>
+                                        <p:attrNameLst>
+                                          <p:attrName>ppt_h</p:attrName>
+                                        </p:attrNameLst>
+                                      </p:cBhvr>
+                                      <p:tavLst>
+                                        <p:tav fmla="" tm="0">
+                                          <p:val>
+                                            <p:strVal val="0"/>
+                                          </p:val>
+                                        </p:tav>
+                                        <p:tav fmla="" tm="100000">
+                                          <p:val>
+                                            <p:strVal val="#ppt_h"/>
+                                          </p:val>
+                                        </p:tav>
+                                      </p:tavLst>
+                                    </p:anim>
+                                  </p:childTnLst>
+                                </p:cTn>
+                              </p:par>
+                            </p:childTnLst>
+                          </p:cTn>
+                        </p:par>
                       </p:childTnLst>
                     </p:cTn>
                   </p:par>
@@ -21730,7 +21730,7 @@
                                           </p:stCondLst>
                                         </p:cTn>
                                         <p:tgtEl>
-                                          <p:spTgt spid="168"/>
+                                          <p:spTgt spid="167"/>
                                         </p:tgtEl>
                                         <p:attrNameLst>
                                           <p:attrName>style.visibility</p:attrName>
@@ -21744,7 +21744,7 @@
                                       <p:cBhvr additive="base">
                                         <p:cTn dur="1000"/>
                                         <p:tgtEl>
-                                          <p:spTgt spid="168"/>
+                                          <p:spTgt spid="167"/>
                                         </p:tgtEl>
                                         <p:attrNameLst>
                                           <p:attrName>ppt_w</p:attrName>
@@ -21767,7 +21767,7 @@
                                       <p:cBhvr additive="base">
                                         <p:cTn dur="1000"/>
                                         <p:tgtEl>
-                                          <p:spTgt spid="168"/>
+                                          <p:spTgt spid="167"/>
                                         </p:tgtEl>
                                         <p:attrNameLst>
                                           <p:attrName>ppt_h</p:attrName>
@@ -21799,7 +21799,7 @@
                                       <p:cBhvr>
                                         <p:cTn dur="1000" fill="hold"/>
                                         <p:tgtEl>
-                                          <p:spTgt spid="168"/>
+                                          <p:spTgt spid="167"/>
                                         </p:tgtEl>
                                         <p:attrNameLst>
                                           <p:attrName>r</p:attrName>

</xml_diff>